<commit_message>
Updated from NTU Desktop
</commit_message>
<xml_diff>
--- a/Presentations/starting_work.pptx
+++ b/Presentations/starting_work.pptx
@@ -108,6 +108,11 @@
       </a:defRPr>
     </a:lvl9pPr>
   </p:defaultTextStyle>
+  <p:extLst>
+    <p:ext uri="{EFAFB233-063F-42B5-8137-9DF3F51BA10A}">
+      <p15:sldGuideLst xmlns:p15="http://schemas.microsoft.com/office/powerpoint/2012/main"/>
+    </p:ext>
+  </p:extLst>
 </p:presentation>
 </file>
 
@@ -647,7 +652,7 @@
           <a:bodyPr/>
           <a:lstStyle/>
           <a:p>
-            <a:fld id="{07640F70-5917-4781-BEF2-990B2170D6A4}" type="datetime1">
+            <a:fld id="{73B1E2BD-2D4C-4365-A05B-3F8037A66EF3}" type="datetime1">
               <a:rPr lang="en-US" smtClean="0"/>
               <a:t>8/28/2017</a:t>
             </a:fld>
@@ -981,7 +986,7 @@
           <a:bodyPr/>
           <a:lstStyle/>
           <a:p>
-            <a:fld id="{D04323E0-EF21-474D-A5A4-6E0A5D6B791C}" type="datetime1">
+            <a:fld id="{0D35DDC7-E354-4AAB-86C2-03C1BD879FBE}" type="datetime1">
               <a:rPr lang="en-US" smtClean="0"/>
               <a:t>8/28/2017</a:t>
             </a:fld>
@@ -1378,7 +1383,7 @@
           <a:bodyPr/>
           <a:lstStyle/>
           <a:p>
-            <a:fld id="{31A32CA8-D984-46F2-AE66-7B3B1BBF7607}" type="datetime1">
+            <a:fld id="{72218E86-B5C7-4D8E-8B3E-3F1A6476A55A}" type="datetime1">
               <a:rPr lang="en-US" smtClean="0"/>
               <a:t>8/28/2017</a:t>
             </a:fld>
@@ -1710,7 +1715,7 @@
           <a:bodyPr/>
           <a:lstStyle/>
           <a:p>
-            <a:fld id="{2B2364EA-B63D-4C44-97CE-FF582378AF76}" type="datetime1">
+            <a:fld id="{1D6070BF-0CE7-4C99-80F8-7BB9A7882004}" type="datetime1">
               <a:rPr lang="en-US" smtClean="0"/>
               <a:t>8/28/2017</a:t>
             </a:fld>
@@ -2026,7 +2031,7 @@
           <a:bodyPr/>
           <a:lstStyle/>
           <a:p>
-            <a:fld id="{5186095C-5F7E-4D3F-9197-39C5516F1EBB}" type="datetime1">
+            <a:fld id="{74A83D2D-62A4-472F-B056-8E3615585778}" type="datetime1">
               <a:rPr lang="en-US" smtClean="0"/>
               <a:t>8/28/2017</a:t>
             </a:fld>
@@ -2418,7 +2423,7 @@
           <a:bodyPr/>
           <a:lstStyle/>
           <a:p>
-            <a:fld id="{276ACA9C-B2F9-433E-BCDB-FDB4BC149648}" type="datetime1">
+            <a:fld id="{BA28D961-FC1F-4443-8BA9-EA4859F51DB0}" type="datetime1">
               <a:rPr lang="en-US" smtClean="0"/>
               <a:t>8/28/2017</a:t>
             </a:fld>
@@ -2671,7 +2676,7 @@
           <a:bodyPr/>
           <a:lstStyle/>
           <a:p>
-            <a:fld id="{959FD649-672E-49D7-82FF-646DAFFBF761}" type="datetime1">
+            <a:fld id="{48E2DA31-7CDF-4FB1-9681-482AE50494F6}" type="datetime1">
               <a:rPr lang="en-US" smtClean="0"/>
               <a:t>8/28/2017</a:t>
             </a:fld>
@@ -2929,7 +2934,7 @@
           <a:bodyPr/>
           <a:lstStyle/>
           <a:p>
-            <a:fld id="{C7D0BD4F-C533-40EF-B4E0-9A8385F19E82}" type="datetime1">
+            <a:fld id="{0510E30D-A13F-493C-B2FE-834158BBC05B}" type="datetime1">
               <a:rPr lang="en-US" smtClean="0"/>
               <a:t>8/28/2017</a:t>
             </a:fld>
@@ -3187,7 +3192,7 @@
           <a:bodyPr/>
           <a:lstStyle/>
           <a:p>
-            <a:fld id="{4FE9B12B-FD0E-45DA-A431-9F25020919C3}" type="datetime1">
+            <a:fld id="{A01FC02B-687E-4F46-8B5A-7AD2318CCB3B}" type="datetime1">
               <a:rPr lang="en-US" smtClean="0"/>
               <a:t>8/28/2017</a:t>
             </a:fld>
@@ -3512,7 +3517,7 @@
           <a:bodyPr/>
           <a:lstStyle/>
           <a:p>
-            <a:fld id="{2B4F2F47-FB67-41E0-9C4C-56DE1A68D2CE}" type="datetime1">
+            <a:fld id="{8031ABD4-8422-4C87-83DB-D8315500EE01}" type="datetime1">
               <a:rPr lang="en-US" smtClean="0"/>
               <a:t>8/28/2017</a:t>
             </a:fld>
@@ -3831,7 +3836,7 @@
           <a:bodyPr/>
           <a:lstStyle/>
           <a:p>
-            <a:fld id="{1FBEB38B-5AE5-406E-A0B0-8A18419FCE94}" type="datetime1">
+            <a:fld id="{7328A5CC-E27C-4001-AFC1-4367D1F81078}" type="datetime1">
               <a:rPr lang="en-US" smtClean="0"/>
               <a:t>8/28/2017</a:t>
             </a:fld>
@@ -4284,7 +4289,7 @@
           <a:bodyPr/>
           <a:lstStyle/>
           <a:p>
-            <a:fld id="{1074CBF7-0968-4C23-AC83-DEECB734947A}" type="datetime1">
+            <a:fld id="{AF9E9591-9136-46FB-AD15-59162C18D235}" type="datetime1">
               <a:rPr lang="en-US" smtClean="0"/>
               <a:t>8/28/2017</a:t>
             </a:fld>
@@ -4485,7 +4490,7 @@
           <a:bodyPr/>
           <a:lstStyle/>
           <a:p>
-            <a:fld id="{9AA95566-D90E-4C99-8D90-565A27976465}" type="datetime1">
+            <a:fld id="{12191FC7-19EF-4F51-9163-C09600C88C2F}" type="datetime1">
               <a:rPr lang="en-US" smtClean="0"/>
               <a:t>8/28/2017</a:t>
             </a:fld>
@@ -4658,7 +4663,7 @@
           <a:bodyPr/>
           <a:lstStyle/>
           <a:p>
-            <a:fld id="{2D7EDC11-2F82-487D-8D10-016E9215CE2E}" type="datetime1">
+            <a:fld id="{0BA71F16-0FAD-4520-9844-B9CD2E8EBEBC}" type="datetime1">
               <a:rPr lang="en-US" smtClean="0"/>
               <a:t>8/28/2017</a:t>
             </a:fld>
@@ -4987,7 +4992,7 @@
           <a:bodyPr/>
           <a:lstStyle/>
           <a:p>
-            <a:fld id="{FBA2D3F6-B1E3-449C-A7BE-2A4F2F57436B}" type="datetime1">
+            <a:fld id="{8255DE45-0AF2-476B-9D6D-782F27A19F52}" type="datetime1">
               <a:rPr lang="en-US" smtClean="0"/>
               <a:t>8/28/2017</a:t>
             </a:fld>
@@ -5328,7 +5333,7 @@
           <a:bodyPr/>
           <a:lstStyle/>
           <a:p>
-            <a:fld id="{6914C7AF-0D2E-42E1-98A4-A302DCF3C7AE}" type="datetime1">
+            <a:fld id="{D871A11F-4446-4913-875F-BE2E81E327AE}" type="datetime1">
               <a:rPr lang="en-US" smtClean="0"/>
               <a:t>8/28/2017</a:t>
             </a:fld>
@@ -7441,7 +7446,7 @@
             </a:lvl1pPr>
           </a:lstStyle>
           <a:p>
-            <a:fld id="{64F65012-CDF8-45C3-BA16-B5F9A63FCF2C}" type="datetime1">
+            <a:fld id="{B3FE156D-CAA6-4157-B7E0-3D324BB69E01}" type="datetime1">
               <a:rPr lang="en-US" smtClean="0"/>
               <a:t>8/28/2017</a:t>
             </a:fld>
@@ -7547,7 +7552,7 @@
     <p:sldLayoutId id="2147483658" r:id="rId15"/>
     <p:sldLayoutId id="2147483659" r:id="rId16"/>
   </p:sldLayoutIdLst>
-  <p:hf hdr="0"/>
+  <p:hf hdr="0" ftr="0"/>
   <p:txStyles>
     <p:titleStyle>
       <a:lvl1pPr algn="l" defTabSz="457200" rtl="0" eaLnBrk="1" latinLnBrk="0" hangingPunct="1">
@@ -8016,6 +8021,13 @@
   <p:clrMapOvr>
     <a:masterClrMapping/>
   </p:clrMapOvr>
+  <p:timing>
+    <p:tnLst>
+      <p:par>
+        <p:cTn id="1" dur="indefinite" restart="never" nodeType="tmRoot"/>
+      </p:par>
+    </p:tnLst>
+  </p:timing>
 </p:sld>
 </file>
 
@@ -8079,9 +8091,88 @@
           <a:bodyPr/>
           <a:lstStyle/>
           <a:p>
+            <a:pPr algn="just"/>
             <a:r>
               <a:rPr lang="en-US" dirty="0" smtClean="0"/>
-              <a:t>Classifiers learns a mapping between inputs and set of classes.</a:t>
+              <a:t>Classifiers learns a mapping between inputs and set of classes</a:t>
+            </a:r>
+            <a:r>
+              <a:rPr lang="en-US" dirty="0" smtClean="0"/>
+              <a:t>.</a:t>
+            </a:r>
+          </a:p>
+          <a:p>
+            <a:pPr lvl="1" algn="just"/>
+            <a:r>
+              <a:rPr lang="en-SG" dirty="0" smtClean="0"/>
+              <a:t>A </a:t>
+            </a:r>
+            <a:r>
+              <a:rPr lang="en-SG" dirty="0"/>
+              <a:t>malware </a:t>
+            </a:r>
+            <a:r>
+              <a:rPr lang="en-SG" dirty="0" smtClean="0"/>
+              <a:t>detector is </a:t>
+            </a:r>
+            <a:r>
+              <a:rPr lang="en-SG" dirty="0"/>
+              <a:t>a </a:t>
+            </a:r>
+            <a:r>
+              <a:rPr lang="en-SG" dirty="0" smtClean="0"/>
+              <a:t>classifier </a:t>
+            </a:r>
+            <a:r>
+              <a:rPr lang="en-SG" dirty="0"/>
+              <a:t>taking executables as inputs and assigning </a:t>
+            </a:r>
+            <a:r>
+              <a:rPr lang="en-SG" dirty="0" smtClean="0"/>
+              <a:t>them to </a:t>
+            </a:r>
+            <a:r>
+              <a:rPr lang="en-SG" dirty="0"/>
+              <a:t>the benign or malware class.</a:t>
+            </a:r>
+            <a:endParaRPr lang="en-US" dirty="0"/>
+          </a:p>
+          <a:p>
+            <a:pPr algn="just"/>
+            <a:endParaRPr lang="en-US" dirty="0" smtClean="0"/>
+          </a:p>
+          <a:p>
+            <a:pPr algn="just"/>
+            <a:endParaRPr lang="en-US" dirty="0"/>
+          </a:p>
+          <a:p>
+            <a:pPr algn="just"/>
+            <a:endParaRPr lang="en-US" dirty="0" smtClean="0"/>
+          </a:p>
+          <a:p>
+            <a:pPr algn="just"/>
+            <a:endParaRPr lang="en-US" dirty="0" smtClean="0"/>
+          </a:p>
+          <a:p>
+            <a:pPr algn="just"/>
+            <a:r>
+              <a:rPr lang="en-US" dirty="0" smtClean="0"/>
+              <a:t>Adversarial examples can compromise the integrity of a classifier.</a:t>
+            </a:r>
+          </a:p>
+          <a:p>
+            <a:pPr lvl="1" algn="just"/>
+            <a:r>
+              <a:rPr lang="en-US" dirty="0" smtClean="0"/>
+              <a:t>To humans, the images appear to be same. But, forces a particular DNN to classify it as a </a:t>
+            </a:r>
+            <a:r>
+              <a:rPr lang="en-US" i="1" dirty="0" smtClean="0"/>
+              <a:t>yield sign</a:t>
+            </a:r>
+            <a:r>
+              <a:rPr lang="en-US" dirty="0" smtClean="0"/>
+              <a:t>.</a:t>
             </a:r>
             <a:endParaRPr lang="en-US" dirty="0"/>
           </a:p>
@@ -8095,7 +8186,7 @@
         </p:nvGrpSpPr>
         <p:grpSpPr>
           <a:xfrm>
-            <a:off x="5292927" y="1571910"/>
+            <a:off x="5342803" y="2288003"/>
             <a:ext cx="3507970" cy="1557467"/>
             <a:chOff x="5054138" y="2998216"/>
             <a:chExt cx="3507970" cy="1557467"/>
@@ -8465,29 +8556,10 @@
           <a:bodyPr/>
           <a:lstStyle/>
           <a:p>
-            <a:fld id="{5048BD6A-42F8-4120-92F0-7BFBC2DB2AF5}" type="datetime1">
+            <a:fld id="{2EFB6F28-65EE-44D6-BFFE-56AB02E1ABA6}" type="datetime1">
               <a:rPr lang="en-US" smtClean="0"/>
               <a:t>8/28/2017</a:t>
             </a:fld>
-            <a:endParaRPr lang="en-US" dirty="0"/>
-          </a:p>
-        </p:txBody>
-      </p:sp>
-      <p:sp>
-        <p:nvSpPr>
-          <p:cNvPr id="25" name="Footer Placeholder 24"/>
-          <p:cNvSpPr>
-            <a:spLocks noGrp="1"/>
-          </p:cNvSpPr>
-          <p:nvPr>
-            <p:ph type="ftr" sz="quarter" idx="11"/>
-          </p:nvPr>
-        </p:nvSpPr>
-        <p:spPr/>
-        <p:txBody>
-          <a:bodyPr/>
-          <a:lstStyle/>
-          <a:p>
             <a:endParaRPr lang="en-US" dirty="0"/>
           </a:p>
         </p:txBody>
@@ -8516,6 +8588,168 @@
           </a:p>
         </p:txBody>
       </p:sp>
+      <p:grpSp>
+        <p:nvGrpSpPr>
+          <p:cNvPr id="14" name="Group 13"/>
+          <p:cNvGrpSpPr/>
+          <p:nvPr/>
+        </p:nvGrpSpPr>
+        <p:grpSpPr>
+          <a:xfrm>
+            <a:off x="6000017" y="4807493"/>
+            <a:ext cx="2135353" cy="1424403"/>
+            <a:chOff x="5956681" y="4262713"/>
+            <a:chExt cx="2135353" cy="1424403"/>
+          </a:xfrm>
+        </p:grpSpPr>
+        <p:grpSp>
+          <p:nvGrpSpPr>
+            <p:cNvPr id="10" name="Group 9"/>
+            <p:cNvGrpSpPr/>
+            <p:nvPr/>
+          </p:nvGrpSpPr>
+          <p:grpSpPr>
+            <a:xfrm>
+              <a:off x="5956682" y="4262713"/>
+              <a:ext cx="2135351" cy="906700"/>
+              <a:chOff x="4385656" y="3751694"/>
+              <a:chExt cx="2135351" cy="906700"/>
+            </a:xfrm>
+          </p:grpSpPr>
+          <p:pic>
+            <p:nvPicPr>
+              <p:cNvPr id="5" name="Picture 4"/>
+              <p:cNvPicPr>
+                <a:picLocks noChangeAspect="1"/>
+              </p:cNvPicPr>
+              <p:nvPr/>
+            </p:nvPicPr>
+            <p:blipFill>
+              <a:blip r:embed="rId2">
+                <a:clrChange>
+                  <a:clrFrom>
+                    <a:srgbClr val="FFFFFF"/>
+                  </a:clrFrom>
+                  <a:clrTo>
+                    <a:srgbClr val="FFFFFF">
+                      <a:alpha val="0"/>
+                    </a:srgbClr>
+                  </a:clrTo>
+                </a:clrChange>
+              </a:blip>
+              <a:stretch>
+                <a:fillRect/>
+              </a:stretch>
+            </p:blipFill>
+            <p:spPr>
+              <a:xfrm>
+                <a:off x="4385656" y="3752462"/>
+                <a:ext cx="907271" cy="905932"/>
+              </a:xfrm>
+              <a:prstGeom prst="rect">
+                <a:avLst/>
+              </a:prstGeom>
+            </p:spPr>
+          </p:pic>
+          <p:pic>
+            <p:nvPicPr>
+              <p:cNvPr id="7" name="Picture 6"/>
+              <p:cNvPicPr>
+                <a:picLocks noChangeAspect="1"/>
+              </p:cNvPicPr>
+              <p:nvPr/>
+            </p:nvPicPr>
+            <p:blipFill>
+              <a:blip r:embed="rId3">
+                <a:clrChange>
+                  <a:clrFrom>
+                    <a:srgbClr val="FFFFFF"/>
+                  </a:clrFrom>
+                  <a:clrTo>
+                    <a:srgbClr val="FFFFFF">
+                      <a:alpha val="0"/>
+                    </a:srgbClr>
+                  </a:clrTo>
+                </a:clrChange>
+              </a:blip>
+              <a:stretch>
+                <a:fillRect/>
+              </a:stretch>
+            </p:blipFill>
+            <p:spPr>
+              <a:xfrm>
+                <a:off x="5612967" y="3751694"/>
+                <a:ext cx="908040" cy="906700"/>
+              </a:xfrm>
+              <a:prstGeom prst="rect">
+                <a:avLst/>
+              </a:prstGeom>
+            </p:spPr>
+          </p:pic>
+        </p:grpSp>
+        <p:sp>
+          <p:nvSpPr>
+            <p:cNvPr id="13" name="TextBox 12"/>
+            <p:cNvSpPr txBox="1"/>
+            <p:nvPr/>
+          </p:nvSpPr>
+          <p:spPr>
+            <a:xfrm>
+              <a:off x="5956681" y="5102341"/>
+              <a:ext cx="907271" cy="338554"/>
+            </a:xfrm>
+            <a:prstGeom prst="rect">
+              <a:avLst/>
+            </a:prstGeom>
+            <a:noFill/>
+          </p:spPr>
+          <p:txBody>
+            <a:bodyPr wrap="square" rtlCol="0">
+              <a:spAutoFit/>
+            </a:bodyPr>
+            <a:lstStyle/>
+            <a:p>
+              <a:pPr algn="ctr"/>
+              <a:r>
+                <a:rPr lang="en-US" sz="800" dirty="0" smtClean="0"/>
+                <a:t>Ordinary Stop Sign</a:t>
+              </a:r>
+              <a:endParaRPr lang="en-US" sz="800" dirty="0"/>
+            </a:p>
+          </p:txBody>
+        </p:sp>
+        <p:sp>
+          <p:nvSpPr>
+            <p:cNvPr id="27" name="TextBox 26"/>
+            <p:cNvSpPr txBox="1"/>
+            <p:nvPr/>
+          </p:nvSpPr>
+          <p:spPr>
+            <a:xfrm>
+              <a:off x="7183994" y="5102341"/>
+              <a:ext cx="908040" cy="584775"/>
+            </a:xfrm>
+            <a:prstGeom prst="rect">
+              <a:avLst/>
+            </a:prstGeom>
+            <a:noFill/>
+          </p:spPr>
+          <p:txBody>
+            <a:bodyPr wrap="square" rtlCol="0">
+              <a:spAutoFit/>
+            </a:bodyPr>
+            <a:lstStyle/>
+            <a:p>
+              <a:pPr algn="ctr"/>
+              <a:r>
+                <a:rPr lang="en-US" sz="800" dirty="0" smtClean="0"/>
+                <a:t>Image produced after precise perturbation</a:t>
+              </a:r>
+              <a:endParaRPr lang="en-US" sz="800" dirty="0"/>
+            </a:p>
+          </p:txBody>
+        </p:sp>
+      </p:grpSp>
     </p:spTree>
     <p:extLst>
       <p:ext uri="{BB962C8B-B14F-4D97-AF65-F5344CB8AC3E}">
@@ -8526,6 +8760,13 @@
   <p:clrMapOvr>
     <a:masterClrMapping/>
   </p:clrMapOvr>
+  <p:timing>
+    <p:tnLst>
+      <p:par>
+        <p:cTn id="1" dur="indefinite" restart="never" nodeType="tmRoot"/>
+      </p:par>
+    </p:tnLst>
+  </p:timing>
 </p:sld>
 </file>
 

</xml_diff>